<commit_message>
Minor Changes to Situation and Response
New Animation
</commit_message>
<xml_diff>
--- a/presentation/Pitch_Wettermonitor.pptx
+++ b/presentation/Pitch_Wettermonitor.pptx
@@ -571,6 +571,10 @@
           <a:bodyPr/>
           <a:lstStyle/>
           <a:p>
+            <a:r>
+              <a:rPr lang="de-CH"/>
+              <a:t>Genderneutral!</a:t>
+            </a:r>
             <a:endParaRPr lang="de-CH" dirty="0"/>
           </a:p>
         </p:txBody>
@@ -1384,6 +1388,109 @@
     <p:extLst>
       <p:ext uri="{BB962C8B-B14F-4D97-AF65-F5344CB8AC3E}">
         <p14:creationId xmlns:p14="http://schemas.microsoft.com/office/powerpoint/2010/main" val="2433385732"/>
+      </p:ext>
+    </p:extLst>
+  </p:cSld>
+  <p:clrMapOvr>
+    <a:masterClrMapping/>
+  </p:clrMapOvr>
+</p:notes>
+</file>
+
+<file path=ppt/notesSlides/notesSlide8.xml><?xml version="1.0" encoding="utf-8"?>
+<p:notes xmlns:a="http://schemas.openxmlformats.org/drawingml/2006/main" xmlns:r="http://schemas.openxmlformats.org/officeDocument/2006/relationships" xmlns:p="http://schemas.openxmlformats.org/presentationml/2006/main">
+  <p:cSld>
+    <p:spTree>
+      <p:nvGrpSpPr>
+        <p:cNvPr id="1" name=""/>
+        <p:cNvGrpSpPr/>
+        <p:nvPr/>
+      </p:nvGrpSpPr>
+      <p:grpSpPr>
+        <a:xfrm>
+          <a:off x="0" y="0"/>
+          <a:ext cx="0" cy="0"/>
+          <a:chOff x="0" y="0"/>
+          <a:chExt cx="0" cy="0"/>
+        </a:xfrm>
+      </p:grpSpPr>
+      <p:sp>
+        <p:nvSpPr>
+          <p:cNvPr id="2" name="Folienbildplatzhalter 1"/>
+          <p:cNvSpPr>
+            <a:spLocks noGrp="1" noRot="1" noChangeAspect="1"/>
+          </p:cNvSpPr>
+          <p:nvPr>
+            <p:ph type="sldImg"/>
+          </p:nvPr>
+        </p:nvSpPr>
+        <p:spPr/>
+      </p:sp>
+      <p:sp>
+        <p:nvSpPr>
+          <p:cNvPr id="3" name="Notizenplatzhalter 2"/>
+          <p:cNvSpPr>
+            <a:spLocks noGrp="1"/>
+          </p:cNvSpPr>
+          <p:nvPr>
+            <p:ph type="body" idx="1"/>
+          </p:nvPr>
+        </p:nvSpPr>
+        <p:spPr/>
+        <p:txBody>
+          <a:bodyPr/>
+          <a:lstStyle/>
+          <a:p>
+            <a:r>
+              <a:rPr lang="de-CH" dirty="0"/>
+              <a:t>Bei Team und Challenge-</a:t>
+            </a:r>
+            <a:r>
+              <a:rPr lang="de-CH" dirty="0" err="1"/>
+              <a:t>Owner</a:t>
+            </a:r>
+            <a:r>
+              <a:rPr lang="de-CH" dirty="0"/>
+              <a:t>, bzw. </a:t>
+            </a:r>
+            <a:r>
+              <a:rPr lang="de-CH" dirty="0" err="1"/>
+              <a:t>Untesrstützer</a:t>
+            </a:r>
+            <a:r>
+              <a:rPr lang="de-CH"/>
+              <a:t> bedanken</a:t>
+            </a:r>
+          </a:p>
+        </p:txBody>
+      </p:sp>
+      <p:sp>
+        <p:nvSpPr>
+          <p:cNvPr id="4" name="Foliennummernplatzhalter 3"/>
+          <p:cNvSpPr>
+            <a:spLocks noGrp="1"/>
+          </p:cNvSpPr>
+          <p:nvPr>
+            <p:ph type="sldNum" sz="quarter" idx="5"/>
+          </p:nvPr>
+        </p:nvSpPr>
+        <p:spPr/>
+        <p:txBody>
+          <a:bodyPr/>
+          <a:lstStyle/>
+          <a:p>
+            <a:fld id="{A517E339-01E5-4374-B23A-E19361DA12EB}" type="slidenum">
+              <a:rPr lang="de-CH" smtClean="0"/>
+              <a:t>8</a:t>
+            </a:fld>
+            <a:endParaRPr lang="de-CH"/>
+          </a:p>
+        </p:txBody>
+      </p:sp>
+    </p:spTree>
+    <p:extLst>
+      <p:ext uri="{BB962C8B-B14F-4D97-AF65-F5344CB8AC3E}">
+        <p14:creationId xmlns:p14="http://schemas.microsoft.com/office/powerpoint/2010/main" val="2658266401"/>
       </p:ext>
     </p:extLst>
   </p:cSld>
@@ -7419,7 +7526,7 @@
         <p:spPr>
           <a:xfrm>
             <a:off x="1992396" y="3139320"/>
-            <a:ext cx="4725965" cy="940590"/>
+            <a:ext cx="1291493" cy="940590"/>
           </a:xfrm>
           <a:prstGeom prst="rect">
             <a:avLst/>
@@ -7472,8 +7579,8 @@
         </p:nvSpPr>
         <p:spPr>
           <a:xfrm>
-            <a:off x="1744879" y="4065280"/>
-            <a:ext cx="4725965" cy="940590"/>
+            <a:off x="1744880" y="4065280"/>
+            <a:ext cx="1379022" cy="940590"/>
           </a:xfrm>
           <a:prstGeom prst="rect">
             <a:avLst/>
@@ -7563,8 +7670,8 @@
         </p:nvSpPr>
         <p:spPr>
           <a:xfrm>
-            <a:off x="1956374" y="4991240"/>
-            <a:ext cx="4725965" cy="940590"/>
+            <a:off x="1956375" y="4991240"/>
+            <a:ext cx="1263476" cy="940590"/>
           </a:xfrm>
           <a:prstGeom prst="rect">
             <a:avLst/>
@@ -8186,6 +8293,41 @@
                                   </p:childTnLst>
                                 </p:cTn>
                               </p:par>
+                              <p:par>
+                                <p:cTn id="49" presetID="10" presetClass="entr" presetSubtype="0" fill="hold" grpId="0" nodeType="withEffect">
+                                  <p:stCondLst>
+                                    <p:cond delay="0"/>
+                                  </p:stCondLst>
+                                  <p:childTnLst>
+                                    <p:set>
+                                      <p:cBhvr>
+                                        <p:cTn id="50" dur="1" fill="hold">
+                                          <p:stCondLst>
+                                            <p:cond delay="0"/>
+                                          </p:stCondLst>
+                                        </p:cTn>
+                                        <p:tgtEl>
+                                          <p:spTgt spid="110"/>
+                                        </p:tgtEl>
+                                        <p:attrNameLst>
+                                          <p:attrName>style.visibility</p:attrName>
+                                        </p:attrNameLst>
+                                      </p:cBhvr>
+                                      <p:to>
+                                        <p:strVal val="visible"/>
+                                      </p:to>
+                                    </p:set>
+                                    <p:animEffect transition="in" filter="fade">
+                                      <p:cBhvr>
+                                        <p:cTn id="51" dur="500"/>
+                                        <p:tgtEl>
+                                          <p:spTgt spid="110"/>
+                                        </p:tgtEl>
+                                      </p:cBhvr>
+                                    </p:animEffect>
+                                  </p:childTnLst>
+                                </p:cTn>
+                              </p:par>
                             </p:childTnLst>
                           </p:cTn>
                         </p:par>
@@ -8193,26 +8335,26 @@
                     </p:cTn>
                   </p:par>
                   <p:par>
-                    <p:cTn id="49" fill="hold">
+                    <p:cTn id="52" fill="hold">
                       <p:stCondLst>
                         <p:cond delay="indefinite"/>
                       </p:stCondLst>
                       <p:childTnLst>
                         <p:par>
-                          <p:cTn id="50" fill="hold">
+                          <p:cTn id="53" fill="hold">
                             <p:stCondLst>
                               <p:cond delay="0"/>
                             </p:stCondLst>
                             <p:childTnLst>
                               <p:par>
-                                <p:cTn id="51" presetID="10" presetClass="exit" presetSubtype="0" fill="hold" grpId="0" nodeType="clickEffect">
+                                <p:cTn id="54" presetID="10" presetClass="exit" presetSubtype="0" fill="hold" grpId="0" nodeType="clickEffect">
                                   <p:stCondLst>
                                     <p:cond delay="0"/>
                                   </p:stCondLst>
                                   <p:childTnLst>
                                     <p:animEffect transition="out" filter="fade">
                                       <p:cBhvr>
-                                        <p:cTn id="52" dur="500"/>
+                                        <p:cTn id="55" dur="500"/>
                                         <p:tgtEl>
                                           <p:spTgt spid="206"/>
                                         </p:tgtEl>
@@ -8220,7 +8362,7 @@
                                     </p:animEffect>
                                     <p:set>
                                       <p:cBhvr>
-                                        <p:cTn id="53" dur="1" fill="hold">
+                                        <p:cTn id="56" dur="1" fill="hold">
                                           <p:stCondLst>
                                             <p:cond delay="499"/>
                                           </p:stCondLst>
@@ -8239,6 +8381,41 @@
                                   </p:childTnLst>
                                 </p:cTn>
                               </p:par>
+                              <p:par>
+                                <p:cTn id="57" presetID="10" presetClass="entr" presetSubtype="0" fill="hold" grpId="0" nodeType="withEffect">
+                                  <p:stCondLst>
+                                    <p:cond delay="0"/>
+                                  </p:stCondLst>
+                                  <p:childTnLst>
+                                    <p:set>
+                                      <p:cBhvr>
+                                        <p:cTn id="58" dur="1" fill="hold">
+                                          <p:stCondLst>
+                                            <p:cond delay="0"/>
+                                          </p:stCondLst>
+                                        </p:cTn>
+                                        <p:tgtEl>
+                                          <p:spTgt spid="111"/>
+                                        </p:tgtEl>
+                                        <p:attrNameLst>
+                                          <p:attrName>style.visibility</p:attrName>
+                                        </p:attrNameLst>
+                                      </p:cBhvr>
+                                      <p:to>
+                                        <p:strVal val="visible"/>
+                                      </p:to>
+                                    </p:set>
+                                    <p:animEffect transition="in" filter="fade">
+                                      <p:cBhvr>
+                                        <p:cTn id="59" dur="500"/>
+                                        <p:tgtEl>
+                                          <p:spTgt spid="111"/>
+                                        </p:tgtEl>
+                                      </p:cBhvr>
+                                    </p:animEffect>
+                                  </p:childTnLst>
+                                </p:cTn>
+                              </p:par>
                             </p:childTnLst>
                           </p:cTn>
                         </p:par>
@@ -8246,26 +8423,26 @@
                     </p:cTn>
                   </p:par>
                   <p:par>
-                    <p:cTn id="54" fill="hold">
+                    <p:cTn id="60" fill="hold">
                       <p:stCondLst>
                         <p:cond delay="indefinite"/>
                       </p:stCondLst>
                       <p:childTnLst>
                         <p:par>
-                          <p:cTn id="55" fill="hold">
+                          <p:cTn id="61" fill="hold">
                             <p:stCondLst>
                               <p:cond delay="0"/>
                             </p:stCondLst>
                             <p:childTnLst>
                               <p:par>
-                                <p:cTn id="56" presetID="10" presetClass="exit" presetSubtype="0" fill="hold" grpId="0" nodeType="clickEffect">
+                                <p:cTn id="62" presetID="10" presetClass="exit" presetSubtype="0" fill="hold" grpId="0" nodeType="clickEffect">
                                   <p:stCondLst>
                                     <p:cond delay="0"/>
                                   </p:stCondLst>
                                   <p:childTnLst>
                                     <p:animEffect transition="out" filter="fade">
                                       <p:cBhvr>
-                                        <p:cTn id="57" dur="500"/>
+                                        <p:cTn id="63" dur="500"/>
                                         <p:tgtEl>
                                           <p:spTgt spid="210"/>
                                         </p:tgtEl>
@@ -8273,7 +8450,7 @@
                                     </p:animEffect>
                                     <p:set>
                                       <p:cBhvr>
-                                        <p:cTn id="58" dur="1" fill="hold">
+                                        <p:cTn id="64" dur="1" fill="hold">
                                           <p:stCondLst>
                                             <p:cond delay="499"/>
                                           </p:stCondLst>
@@ -8289,6 +8466,41 @@
                                         <p:strVal val="hidden"/>
                                       </p:to>
                                     </p:set>
+                                  </p:childTnLst>
+                                </p:cTn>
+                              </p:par>
+                              <p:par>
+                                <p:cTn id="65" presetID="10" presetClass="entr" presetSubtype="0" fill="hold" grpId="0" nodeType="withEffect">
+                                  <p:stCondLst>
+                                    <p:cond delay="0"/>
+                                  </p:stCondLst>
+                                  <p:childTnLst>
+                                    <p:set>
+                                      <p:cBhvr>
+                                        <p:cTn id="66" dur="1" fill="hold">
+                                          <p:stCondLst>
+                                            <p:cond delay="0"/>
+                                          </p:stCondLst>
+                                        </p:cTn>
+                                        <p:tgtEl>
+                                          <p:spTgt spid="209"/>
+                                        </p:tgtEl>
+                                        <p:attrNameLst>
+                                          <p:attrName>style.visibility</p:attrName>
+                                        </p:attrNameLst>
+                                      </p:cBhvr>
+                                      <p:to>
+                                        <p:strVal val="visible"/>
+                                      </p:to>
+                                    </p:set>
+                                    <p:animEffect transition="in" filter="fade">
+                                      <p:cBhvr>
+                                        <p:cTn id="67" dur="500"/>
+                                        <p:tgtEl>
+                                          <p:spTgt spid="209"/>
+                                        </p:tgtEl>
+                                      </p:cBhvr>
+                                    </p:animEffect>
                                   </p:childTnLst>
                                 </p:cTn>
                               </p:par>
@@ -8320,6 +8532,8 @@
       </p:par>
     </p:tnLst>
     <p:bldLst>
+      <p:bldP spid="110" grpId="0"/>
+      <p:bldP spid="111" grpId="0"/>
       <p:bldP spid="168" grpId="0" animBg="1"/>
       <p:bldP spid="169" grpId="0" animBg="1"/>
       <p:bldP spid="170" grpId="0" animBg="1"/>
@@ -8328,6 +8542,7 @@
       <p:bldP spid="203" grpId="0" animBg="1"/>
       <p:bldP spid="205" grpId="0" animBg="1"/>
       <p:bldP spid="206" grpId="0" animBg="1"/>
+      <p:bldP spid="209" grpId="0"/>
       <p:bldP spid="210" grpId="0" animBg="1"/>
     </p:bldLst>
   </p:timing>
@@ -11052,7 +11267,7 @@
         </p:nvCxnSpPr>
         <p:spPr>
           <a:xfrm>
-            <a:off x="4794380" y="356078"/>
+            <a:off x="4794380" y="365043"/>
             <a:ext cx="2603240" cy="0"/>
           </a:xfrm>
           <a:prstGeom prst="line">
@@ -11874,7 +12089,7 @@
         <p:spPr>
           <a:xfrm>
             <a:off x="2047914" y="3040741"/>
-            <a:ext cx="4725965" cy="940590"/>
+            <a:ext cx="1149383" cy="940590"/>
           </a:xfrm>
           <a:prstGeom prst="rect">
             <a:avLst/>
@@ -11928,7 +12143,7 @@
         <p:spPr>
           <a:xfrm>
             <a:off x="2099689" y="3981331"/>
-            <a:ext cx="4725965" cy="940590"/>
+            <a:ext cx="1149383" cy="940590"/>
           </a:xfrm>
           <a:prstGeom prst="rect">
             <a:avLst/>
@@ -11981,8 +12196,8 @@
         </p:nvSpPr>
         <p:spPr>
           <a:xfrm>
-            <a:off x="2145272" y="5096579"/>
-            <a:ext cx="4725965" cy="940590"/>
+            <a:off x="2145273" y="5096579"/>
+            <a:ext cx="1063618" cy="940590"/>
           </a:xfrm>
           <a:prstGeom prst="rect">
             <a:avLst/>
@@ -12462,6 +12677,41 @@
                                   </p:childTnLst>
                                 </p:cTn>
                               </p:par>
+                              <p:par>
+                                <p:cTn id="37" presetID="10" presetClass="entr" presetSubtype="0" fill="hold" grpId="0" nodeType="withEffect">
+                                  <p:stCondLst>
+                                    <p:cond delay="0"/>
+                                  </p:stCondLst>
+                                  <p:childTnLst>
+                                    <p:set>
+                                      <p:cBhvr>
+                                        <p:cTn id="38" dur="1" fill="hold">
+                                          <p:stCondLst>
+                                            <p:cond delay="0"/>
+                                          </p:stCondLst>
+                                        </p:cTn>
+                                        <p:tgtEl>
+                                          <p:spTgt spid="34"/>
+                                        </p:tgtEl>
+                                        <p:attrNameLst>
+                                          <p:attrName>style.visibility</p:attrName>
+                                        </p:attrNameLst>
+                                      </p:cBhvr>
+                                      <p:to>
+                                        <p:strVal val="visible"/>
+                                      </p:to>
+                                    </p:set>
+                                    <p:animEffect transition="in" filter="fade">
+                                      <p:cBhvr>
+                                        <p:cTn id="39" dur="500"/>
+                                        <p:tgtEl>
+                                          <p:spTgt spid="34"/>
+                                        </p:tgtEl>
+                                      </p:cBhvr>
+                                    </p:animEffect>
+                                  </p:childTnLst>
+                                </p:cTn>
+                              </p:par>
                             </p:childTnLst>
                           </p:cTn>
                         </p:par>
@@ -12469,26 +12719,26 @@
                     </p:cTn>
                   </p:par>
                   <p:par>
-                    <p:cTn id="37" fill="hold">
+                    <p:cTn id="40" fill="hold">
                       <p:stCondLst>
                         <p:cond delay="indefinite"/>
                       </p:stCondLst>
                       <p:childTnLst>
                         <p:par>
-                          <p:cTn id="38" fill="hold">
+                          <p:cTn id="41" fill="hold">
                             <p:stCondLst>
                               <p:cond delay="0"/>
                             </p:stCondLst>
                             <p:childTnLst>
                               <p:par>
-                                <p:cTn id="39" presetID="10" presetClass="exit" presetSubtype="0" fill="hold" grpId="0" nodeType="clickEffect">
+                                <p:cTn id="42" presetID="10" presetClass="exit" presetSubtype="0" fill="hold" grpId="0" nodeType="clickEffect">
                                   <p:stCondLst>
                                     <p:cond delay="0"/>
                                   </p:stCondLst>
                                   <p:childTnLst>
                                     <p:animEffect transition="out" filter="fade">
                                       <p:cBhvr>
-                                        <p:cTn id="40" dur="500"/>
+                                        <p:cTn id="43" dur="500"/>
                                         <p:tgtEl>
                                           <p:spTgt spid="38"/>
                                         </p:tgtEl>
@@ -12496,7 +12746,7 @@
                                     </p:animEffect>
                                     <p:set>
                                       <p:cBhvr>
-                                        <p:cTn id="41" dur="1" fill="hold">
+                                        <p:cTn id="44" dur="1" fill="hold">
                                           <p:stCondLst>
                                             <p:cond delay="499"/>
                                           </p:stCondLst>
@@ -12515,6 +12765,41 @@
                                   </p:childTnLst>
                                 </p:cTn>
                               </p:par>
+                              <p:par>
+                                <p:cTn id="45" presetID="10" presetClass="entr" presetSubtype="0" fill="hold" grpId="0" nodeType="withEffect">
+                                  <p:stCondLst>
+                                    <p:cond delay="0"/>
+                                  </p:stCondLst>
+                                  <p:childTnLst>
+                                    <p:set>
+                                      <p:cBhvr>
+                                        <p:cTn id="46" dur="1" fill="hold">
+                                          <p:stCondLst>
+                                            <p:cond delay="0"/>
+                                          </p:stCondLst>
+                                        </p:cTn>
+                                        <p:tgtEl>
+                                          <p:spTgt spid="35"/>
+                                        </p:tgtEl>
+                                        <p:attrNameLst>
+                                          <p:attrName>style.visibility</p:attrName>
+                                        </p:attrNameLst>
+                                      </p:cBhvr>
+                                      <p:to>
+                                        <p:strVal val="visible"/>
+                                      </p:to>
+                                    </p:set>
+                                    <p:animEffect transition="in" filter="fade">
+                                      <p:cBhvr>
+                                        <p:cTn id="47" dur="500"/>
+                                        <p:tgtEl>
+                                          <p:spTgt spid="35"/>
+                                        </p:tgtEl>
+                                      </p:cBhvr>
+                                    </p:animEffect>
+                                  </p:childTnLst>
+                                </p:cTn>
+                              </p:par>
                             </p:childTnLst>
                           </p:cTn>
                         </p:par>
@@ -12522,26 +12807,26 @@
                     </p:cTn>
                   </p:par>
                   <p:par>
-                    <p:cTn id="42" fill="hold">
+                    <p:cTn id="48" fill="hold">
                       <p:stCondLst>
                         <p:cond delay="indefinite"/>
                       </p:stCondLst>
                       <p:childTnLst>
                         <p:par>
-                          <p:cTn id="43" fill="hold">
+                          <p:cTn id="49" fill="hold">
                             <p:stCondLst>
                               <p:cond delay="0"/>
                             </p:stCondLst>
                             <p:childTnLst>
                               <p:par>
-                                <p:cTn id="44" presetID="10" presetClass="exit" presetSubtype="0" fill="hold" grpId="0" nodeType="clickEffect">
+                                <p:cTn id="50" presetID="10" presetClass="exit" presetSubtype="0" fill="hold" grpId="0" nodeType="clickEffect">
                                   <p:stCondLst>
                                     <p:cond delay="0"/>
                                   </p:stCondLst>
                                   <p:childTnLst>
                                     <p:animEffect transition="out" filter="fade">
                                       <p:cBhvr>
-                                        <p:cTn id="45" dur="500"/>
+                                        <p:cTn id="51" dur="500"/>
                                         <p:tgtEl>
                                           <p:spTgt spid="41"/>
                                         </p:tgtEl>
@@ -12549,7 +12834,7 @@
                                     </p:animEffect>
                                     <p:set>
                                       <p:cBhvr>
-                                        <p:cTn id="46" dur="1" fill="hold">
+                                        <p:cTn id="52" dur="1" fill="hold">
                                           <p:stCondLst>
                                             <p:cond delay="499"/>
                                           </p:stCondLst>
@@ -12565,6 +12850,41 @@
                                         <p:strVal val="hidden"/>
                                       </p:to>
                                     </p:set>
+                                  </p:childTnLst>
+                                </p:cTn>
+                              </p:par>
+                              <p:par>
+                                <p:cTn id="53" presetID="10" presetClass="entr" presetSubtype="0" fill="hold" grpId="0" nodeType="withEffect">
+                                  <p:stCondLst>
+                                    <p:cond delay="0"/>
+                                  </p:stCondLst>
+                                  <p:childTnLst>
+                                    <p:set>
+                                      <p:cBhvr>
+                                        <p:cTn id="54" dur="1" fill="hold">
+                                          <p:stCondLst>
+                                            <p:cond delay="0"/>
+                                          </p:stCondLst>
+                                        </p:cTn>
+                                        <p:tgtEl>
+                                          <p:spTgt spid="40"/>
+                                        </p:tgtEl>
+                                        <p:attrNameLst>
+                                          <p:attrName>style.visibility</p:attrName>
+                                        </p:attrNameLst>
+                                      </p:cBhvr>
+                                      <p:to>
+                                        <p:strVal val="visible"/>
+                                      </p:to>
+                                    </p:set>
+                                    <p:animEffect transition="in" filter="fade">
+                                      <p:cBhvr>
+                                        <p:cTn id="55" dur="500"/>
+                                        <p:tgtEl>
+                                          <p:spTgt spid="40"/>
+                                        </p:tgtEl>
+                                      </p:cBhvr>
+                                    </p:animEffect>
                                   </p:childTnLst>
                                 </p:cTn>
                               </p:par>
@@ -12596,10 +12916,13 @@
       </p:par>
     </p:tnLst>
     <p:bldLst>
+      <p:bldP spid="40" grpId="0"/>
       <p:bldP spid="11" grpId="0" animBg="1"/>
       <p:bldP spid="12" grpId="0" animBg="1"/>
       <p:bldP spid="23" grpId="0" animBg="1"/>
       <p:bldP spid="26" grpId="0" animBg="1"/>
+      <p:bldP spid="34" grpId="0"/>
+      <p:bldP spid="35" grpId="0"/>
       <p:bldP spid="37" grpId="0" animBg="1"/>
       <p:bldP spid="38" grpId="0" animBg="1"/>
       <p:bldP spid="41" grpId="0" animBg="1"/>

</xml_diff>

<commit_message>
Integrated Monitor into Presentation
</commit_message>
<xml_diff>
--- a/presentation/Pitch_Wettermonitor.pptx
+++ b/presentation/Pitch_Wettermonitor.pptx
@@ -259,7 +259,7 @@
           <a:p>
             <a:fld id="{43AA8551-E6E7-4FB5-B01F-7A753AEBEF86}" type="datetimeFigureOut">
               <a:rPr lang="de-CH" smtClean="0"/>
-              <a:t>17.12.2019</a:t>
+              <a:t>18.12.2019</a:t>
             </a:fld>
             <a:endParaRPr lang="de-CH"/>
           </a:p>
@@ -1649,7 +1649,7 @@
           <a:p>
             <a:fld id="{005879E7-CDE2-4A6D-9018-DC0630526B85}" type="datetimeFigureOut">
               <a:rPr lang="de-CH" smtClean="0"/>
-              <a:t>17.12.2019</a:t>
+              <a:t>18.12.2019</a:t>
             </a:fld>
             <a:endParaRPr lang="de-CH"/>
           </a:p>
@@ -1849,7 +1849,7 @@
           <a:p>
             <a:fld id="{005879E7-CDE2-4A6D-9018-DC0630526B85}" type="datetimeFigureOut">
               <a:rPr lang="de-CH" smtClean="0"/>
-              <a:t>17.12.2019</a:t>
+              <a:t>18.12.2019</a:t>
             </a:fld>
             <a:endParaRPr lang="de-CH"/>
           </a:p>
@@ -2059,7 +2059,7 @@
           <a:p>
             <a:fld id="{005879E7-CDE2-4A6D-9018-DC0630526B85}" type="datetimeFigureOut">
               <a:rPr lang="de-CH" smtClean="0"/>
-              <a:t>17.12.2019</a:t>
+              <a:t>18.12.2019</a:t>
             </a:fld>
             <a:endParaRPr lang="de-CH"/>
           </a:p>
@@ -2259,7 +2259,7 @@
           <a:p>
             <a:fld id="{005879E7-CDE2-4A6D-9018-DC0630526B85}" type="datetimeFigureOut">
               <a:rPr lang="de-CH" smtClean="0"/>
-              <a:t>17.12.2019</a:t>
+              <a:t>18.12.2019</a:t>
             </a:fld>
             <a:endParaRPr lang="de-CH"/>
           </a:p>
@@ -2535,7 +2535,7 @@
           <a:p>
             <a:fld id="{005879E7-CDE2-4A6D-9018-DC0630526B85}" type="datetimeFigureOut">
               <a:rPr lang="de-CH" smtClean="0"/>
-              <a:t>17.12.2019</a:t>
+              <a:t>18.12.2019</a:t>
             </a:fld>
             <a:endParaRPr lang="de-CH"/>
           </a:p>
@@ -2803,7 +2803,7 @@
           <a:p>
             <a:fld id="{005879E7-CDE2-4A6D-9018-DC0630526B85}" type="datetimeFigureOut">
               <a:rPr lang="de-CH" smtClean="0"/>
-              <a:t>17.12.2019</a:t>
+              <a:t>18.12.2019</a:t>
             </a:fld>
             <a:endParaRPr lang="de-CH"/>
           </a:p>
@@ -3218,7 +3218,7 @@
           <a:p>
             <a:fld id="{005879E7-CDE2-4A6D-9018-DC0630526B85}" type="datetimeFigureOut">
               <a:rPr lang="de-CH" smtClean="0"/>
-              <a:t>17.12.2019</a:t>
+              <a:t>18.12.2019</a:t>
             </a:fld>
             <a:endParaRPr lang="de-CH"/>
           </a:p>
@@ -3360,7 +3360,7 @@
           <a:p>
             <a:fld id="{005879E7-CDE2-4A6D-9018-DC0630526B85}" type="datetimeFigureOut">
               <a:rPr lang="de-CH" smtClean="0"/>
-              <a:t>17.12.2019</a:t>
+              <a:t>18.12.2019</a:t>
             </a:fld>
             <a:endParaRPr lang="de-CH"/>
           </a:p>
@@ -3473,7 +3473,7 @@
           <a:p>
             <a:fld id="{005879E7-CDE2-4A6D-9018-DC0630526B85}" type="datetimeFigureOut">
               <a:rPr lang="de-CH" smtClean="0"/>
-              <a:t>17.12.2019</a:t>
+              <a:t>18.12.2019</a:t>
             </a:fld>
             <a:endParaRPr lang="de-CH"/>
           </a:p>
@@ -3786,7 +3786,7 @@
           <a:p>
             <a:fld id="{005879E7-CDE2-4A6D-9018-DC0630526B85}" type="datetimeFigureOut">
               <a:rPr lang="de-CH" smtClean="0"/>
-              <a:t>17.12.2019</a:t>
+              <a:t>18.12.2019</a:t>
             </a:fld>
             <a:endParaRPr lang="de-CH"/>
           </a:p>
@@ -4075,7 +4075,7 @@
           <a:p>
             <a:fld id="{005879E7-CDE2-4A6D-9018-DC0630526B85}" type="datetimeFigureOut">
               <a:rPr lang="de-CH" smtClean="0"/>
-              <a:t>17.12.2019</a:t>
+              <a:t>18.12.2019</a:t>
             </a:fld>
             <a:endParaRPr lang="de-CH"/>
           </a:p>
@@ -4318,7 +4318,7 @@
           <a:p>
             <a:fld id="{005879E7-CDE2-4A6D-9018-DC0630526B85}" type="datetimeFigureOut">
               <a:rPr lang="de-CH" smtClean="0"/>
-              <a:t>17.12.2019</a:t>
+              <a:t>18.12.2019</a:t>
             </a:fld>
             <a:endParaRPr lang="de-CH"/>
           </a:p>
@@ -8692,63 +8692,71 @@
           <a:chExt cx="0" cy="0"/>
         </a:xfrm>
       </p:grpSpPr>
-      <p:sp>
-        <p:nvSpPr>
-          <p:cNvPr id="2" name="Titel 1">
+      <p:pic>
+        <p:nvPicPr>
+          <p:cNvPr id="8" name="Grafik 7" descr="Ein Bild, das Elektronik, Anzeige enthält.&#10;&#10;Automatisch generierte Beschreibung">
             <a:extLst>
               <a:ext uri="{FF2B5EF4-FFF2-40B4-BE49-F238E27FC236}">
-                <a16:creationId xmlns:a16="http://schemas.microsoft.com/office/drawing/2014/main" id="{C9E6BAEE-5F37-49E4-88B0-C50B61FF71C8}"/>
+                <a16:creationId xmlns:a16="http://schemas.microsoft.com/office/drawing/2014/main" id="{369EC858-94A7-4A08-BE49-BA7898CA5B69}"/>
               </a:ext>
             </a:extLst>
           </p:cNvPr>
-          <p:cNvSpPr>
-            <a:spLocks noGrp="1"/>
-          </p:cNvSpPr>
-          <p:nvPr>
-            <p:ph type="title"/>
-          </p:nvPr>
-        </p:nvSpPr>
-        <p:spPr/>
-        <p:txBody>
-          <a:bodyPr/>
-          <a:lstStyle/>
-          <a:p>
-            <a:r>
-              <a:rPr lang="de-CH" dirty="0" err="1"/>
-              <a:t>Placeholder</a:t>
-            </a:r>
-            <a:r>
-              <a:rPr lang="de-CH" dirty="0"/>
-              <a:t> Screenshot Dashboard</a:t>
-            </a:r>
-          </a:p>
-        </p:txBody>
-      </p:sp>
-      <p:sp>
-        <p:nvSpPr>
-          <p:cNvPr id="3" name="Inhaltsplatzhalter 2">
+          <p:cNvPicPr>
+            <a:picLocks noChangeAspect="1"/>
+          </p:cNvPicPr>
+          <p:nvPr/>
+        </p:nvPicPr>
+        <p:blipFill>
+          <a:blip r:embed="rId3">
+            <a:extLst>
+              <a:ext uri="{28A0092B-C50C-407E-A947-70E740481C1C}">
+                <a14:useLocalDpi xmlns:a14="http://schemas.microsoft.com/office/drawing/2010/main" val="0"/>
+              </a:ext>
+            </a:extLst>
+          </a:blip>
+          <a:stretch>
+            <a:fillRect/>
+          </a:stretch>
+        </p:blipFill>
+        <p:spPr>
+          <a:xfrm>
+            <a:off x="-2318886" y="-688932"/>
+            <a:ext cx="17436230" cy="9807879"/>
+          </a:xfrm>
+          <a:prstGeom prst="rect">
+            <a:avLst/>
+          </a:prstGeom>
+        </p:spPr>
+      </p:pic>
+      <p:pic>
+        <p:nvPicPr>
+          <p:cNvPr id="9" name="Grafik 8">
             <a:extLst>
               <a:ext uri="{FF2B5EF4-FFF2-40B4-BE49-F238E27FC236}">
-                <a16:creationId xmlns:a16="http://schemas.microsoft.com/office/drawing/2014/main" id="{0792B87A-02AC-4B79-841F-DCE974439B4C}"/>
+                <a16:creationId xmlns:a16="http://schemas.microsoft.com/office/drawing/2014/main" id="{16E15330-BC2C-46B9-88A9-0E5D0FF4F9FF}"/>
               </a:ext>
             </a:extLst>
           </p:cNvPr>
-          <p:cNvSpPr>
-            <a:spLocks noGrp="1"/>
-          </p:cNvSpPr>
-          <p:nvPr>
-            <p:ph idx="1"/>
-          </p:nvPr>
-        </p:nvSpPr>
-        <p:spPr/>
-        <p:txBody>
-          <a:bodyPr/>
-          <a:lstStyle/>
-          <a:p>
-            <a:endParaRPr lang="de-CH"/>
-          </a:p>
-        </p:txBody>
-      </p:sp>
+          <p:cNvPicPr>
+            <a:picLocks noChangeAspect="1"/>
+          </p:cNvPicPr>
+          <p:nvPr/>
+        </p:nvPicPr>
+        <p:blipFill rotWithShape="1">
+          <a:blip r:embed="rId4"/>
+          <a:srcRect b="6962"/>
+          <a:stretch/>
+        </p:blipFill>
+        <p:spPr>
+          <a:xfrm>
+            <a:off x="1956922" y="691180"/>
+            <a:ext cx="8334394" cy="4519647"/>
+          </a:xfrm>
+          <a:prstGeom prst="rect">
+            <a:avLst/>
+          </a:prstGeom>
+        </p:spPr>
+      </p:pic>
     </p:spTree>
     <p:extLst>
       <p:ext uri="{BB962C8B-B14F-4D97-AF65-F5344CB8AC3E}">

</xml_diff>